<commit_message>
Update graphs in PPTx
</commit_message>
<xml_diff>
--- a/Phase 1 Presentation.pptx
+++ b/Phase 1 Presentation.pptx
@@ -284,6 +284,43 @@
 </p:presentation>
 </file>
 
+<file path=ppt/revisionInfo.xml><?xml version="1.0" encoding="utf-8"?>
+<p1510:revInfo xmlns:a="http://schemas.openxmlformats.org/drawingml/2006/main" xmlns:r="http://schemas.openxmlformats.org/officeDocument/2006/relationships" xmlns:p1510="http://schemas.microsoft.com/office/powerpoint/2015/10/main">
+  <p1510:revLst>
+    <p1510:client id="{16E90E2B-C86A-464D-9003-E71BE3A2D99B}" v="3" dt="2024-09-12T21:14:02.028"/>
+  </p1510:revLst>
+</p1510:revInfo>
+</file>
+
+<file path=ppt/changesInfos/changesInfo1.xml><?xml version="1.0" encoding="utf-8"?>
+<pc:chgInfo xmlns:a="http://schemas.openxmlformats.org/drawingml/2006/main" xmlns:r="http://schemas.openxmlformats.org/officeDocument/2006/relationships" xmlns:ac="http://schemas.microsoft.com/office/drawing/2013/main/command" xmlns:pc="http://schemas.microsoft.com/office/powerpoint/2013/main/command">
+  <pc:docChgLst>
+    <pc:chgData name="Guest User" providerId="Windows Live" clId="Web-{16E90E2B-C86A-464D-9003-E71BE3A2D99B}"/>
+    <pc:docChg chg="modSld">
+      <pc:chgData name="Guest User" userId="" providerId="Windows Live" clId="Web-{16E90E2B-C86A-464D-9003-E71BE3A2D99B}" dt="2024-09-12T21:14:02.028" v="2" actId="20577"/>
+      <pc:docMkLst>
+        <pc:docMk/>
+      </pc:docMkLst>
+      <pc:sldChg chg="modSp">
+        <pc:chgData name="Guest User" userId="" providerId="Windows Live" clId="Web-{16E90E2B-C86A-464D-9003-E71BE3A2D99B}" dt="2024-09-12T21:14:02.028" v="2" actId="20577"/>
+        <pc:sldMkLst>
+          <pc:docMk/>
+          <pc:sldMk cId="0" sldId="256"/>
+        </pc:sldMkLst>
+        <pc:spChg chg="mod">
+          <ac:chgData name="Guest User" userId="" providerId="Windows Live" clId="Web-{16E90E2B-C86A-464D-9003-E71BE3A2D99B}" dt="2024-09-12T21:14:02.028" v="2" actId="20577"/>
+          <ac:spMkLst>
+            <pc:docMk/>
+            <pc:sldMk cId="0" sldId="256"/>
+            <ac:spMk id="66" creationId="{00000000-0000-0000-0000-000000000000}"/>
+          </ac:spMkLst>
+        </pc:spChg>
+      </pc:sldChg>
+    </pc:docChg>
+  </pc:docChgLst>
+</pc:chgInfo>
+</file>
+
 <file path=ppt/notesMasters/notesMaster1.xml><?xml version="1.0" encoding="utf-8"?>
 <p:notesMaster xmlns:a="http://schemas.openxmlformats.org/drawingml/2006/main" xmlns:r="http://schemas.openxmlformats.org/officeDocument/2006/relationships" xmlns:p="http://schemas.openxmlformats.org/presentationml/2006/main">
   <p:cSld>
@@ -754,8 +791,8 @@
         </p:nvSpPr>
         <p:spPr>
           <a:xfrm>
-            <a:off x="381300" y="685800"/>
-            <a:ext cx="6096075" cy="3429000"/>
+            <a:off x="381000" y="685800"/>
+            <a:ext cx="6096000" cy="3429000"/>
           </a:xfrm>
           <a:custGeom>
             <a:avLst/>
@@ -1586,7 +1623,7 @@
         </p:nvSpPr>
         <p:spPr>
           <a:xfrm>
-            <a:off x="381300" y="685800"/>
+            <a:off x="381000" y="685800"/>
             <a:ext cx="6096000" cy="3429000"/>
           </a:xfrm>
           <a:custGeom>
@@ -1690,7 +1727,7 @@
         </p:nvSpPr>
         <p:spPr>
           <a:xfrm>
-            <a:off x="381300" y="685800"/>
+            <a:off x="381000" y="685800"/>
             <a:ext cx="6096000" cy="3429000"/>
           </a:xfrm>
           <a:custGeom>
@@ -1794,7 +1831,7 @@
         </p:nvSpPr>
         <p:spPr>
           <a:xfrm>
-            <a:off x="381300" y="685800"/>
+            <a:off x="381000" y="685800"/>
             <a:ext cx="6096000" cy="3429000"/>
           </a:xfrm>
           <a:custGeom>
@@ -7431,7 +7468,7 @@
         </p:spPr>
         <p:txBody>
           <a:bodyPr spcFirstLastPara="1" wrap="square" lIns="91425" tIns="91425" rIns="91425" bIns="91425" anchor="t" anchorCtr="0">
-            <a:normAutofit fontScale="62500" lnSpcReduction="20000"/>
+            <a:normAutofit fontScale="77500" lnSpcReduction="20000"/>
           </a:bodyPr>
           <a:lstStyle/>
           <a:p>
@@ -7583,26 +7620,26 @@
               <a:buChar char="●"/>
             </a:pPr>
             <a:r>
-              <a:rPr lang="en" dirty="0"/>
+              <a:rPr lang="en"/>
               <a:t>Consider </a:t>
             </a:r>
             <a:r>
-              <a:rPr lang="en" b="1" dirty="0"/>
+              <a:rPr lang="en" b="1"/>
               <a:t>Cessna</a:t>
             </a:r>
             <a:r>
-              <a:rPr lang="en" dirty="0"/>
+              <a:rPr lang="en"/>
               <a:t> or </a:t>
             </a:r>
             <a:r>
-              <a:rPr lang="en" b="1" dirty="0"/>
+              <a:rPr lang="en" b="1"/>
               <a:t>Piper</a:t>
             </a:r>
             <a:r>
-              <a:rPr lang="en" dirty="0"/>
+              <a:rPr lang="en"/>
               <a:t> makes (Cessna 172, 158, or Piper PA-28).</a:t>
             </a:r>
-            <a:endParaRPr dirty="0"/>
+            <a:endParaRPr/>
           </a:p>
           <a:p>
             <a:pPr marL="457200" lvl="0" indent="-342900" algn="l" rtl="0">
@@ -7616,34 +7653,34 @@
               <a:buChar char="●"/>
             </a:pPr>
             <a:r>
-              <a:rPr lang="en" dirty="0"/>
+              <a:rPr lang="en"/>
               <a:t>Focus on safety during </a:t>
             </a:r>
             <a:r>
-              <a:rPr lang="en" b="1" dirty="0"/>
+              <a:rPr lang="en" b="1"/>
               <a:t>climb</a:t>
             </a:r>
             <a:r>
-              <a:rPr lang="en" dirty="0"/>
+              <a:rPr lang="en"/>
               <a:t>, </a:t>
             </a:r>
             <a:r>
-              <a:rPr lang="en" b="1" dirty="0"/>
+              <a:rPr lang="en" b="1"/>
               <a:t>cruise</a:t>
             </a:r>
             <a:r>
-              <a:rPr lang="en" dirty="0"/>
+              <a:rPr lang="en"/>
               <a:t>, and </a:t>
             </a:r>
             <a:r>
-              <a:rPr lang="en" b="1" dirty="0"/>
+              <a:rPr lang="en" b="1"/>
               <a:t>maneuvering</a:t>
             </a:r>
             <a:r>
-              <a:rPr lang="en" dirty="0"/>
+              <a:rPr lang="en"/>
               <a:t> phases of flight.</a:t>
             </a:r>
-            <a:endParaRPr dirty="0"/>
+            <a:endParaRPr/>
           </a:p>
           <a:p>
             <a:pPr marL="457200" lvl="0" indent="-342900" algn="l" rtl="0">
@@ -7657,18 +7694,18 @@
               <a:buChar char="●"/>
             </a:pPr>
             <a:r>
-              <a:rPr lang="en" dirty="0"/>
+              <a:rPr lang="en"/>
               <a:t>Focus on safety during </a:t>
             </a:r>
             <a:r>
-              <a:rPr lang="en" b="1" dirty="0"/>
+              <a:rPr lang="en" b="1"/>
               <a:t>winter</a:t>
             </a:r>
             <a:r>
-              <a:rPr lang="en" dirty="0"/>
+              <a:rPr lang="en"/>
               <a:t> flying.</a:t>
             </a:r>
-            <a:endParaRPr dirty="0"/>
+            <a:endParaRPr/>
           </a:p>
           <a:p>
             <a:pPr marL="0" lvl="0" indent="0" algn="l" rtl="0">
@@ -7681,7 +7718,7 @@
               <a:buNone/>
             </a:pPr>
             <a:r>
-              <a:rPr lang="en" dirty="0"/>
+              <a:rPr lang="en"/>
               <a:t>Next Steps:</a:t>
             </a:r>
           </a:p>
@@ -7692,7 +7729,7 @@
               </a:spcBef>
             </a:pPr>
             <a:r>
-              <a:rPr lang="en-US" dirty="0"/>
+              <a:rPr lang="en-US"/>
               <a:t>Investigate the geographical locations of accidents to gain insight.</a:t>
             </a:r>
           </a:p>
@@ -7703,10 +7740,10 @@
               </a:spcBef>
             </a:pPr>
             <a:r>
-              <a:rPr lang="en-US" dirty="0"/>
+              <a:rPr lang="en-US"/>
               <a:t>Investigate weather conditions.</a:t>
             </a:r>
-            <a:endParaRPr dirty="0"/>
+            <a:endParaRPr/>
           </a:p>
           <a:p>
             <a:pPr marL="0" lvl="0" indent="0" algn="l" rtl="0">
@@ -7718,7 +7755,7 @@
               </a:spcAft>
               <a:buNone/>
             </a:pPr>
-            <a:endParaRPr dirty="0"/>
+            <a:endParaRPr/>
           </a:p>
         </p:txBody>
       </p:sp>
@@ -7824,18 +7861,18 @@
               <a:buNone/>
             </a:pPr>
             <a:r>
-              <a:rPr lang="en" b="1" dirty="0"/>
+              <a:rPr lang="en" b="1"/>
               <a:t>Email</a:t>
             </a:r>
             <a:r>
-              <a:rPr lang="en" dirty="0"/>
+              <a:rPr lang="en"/>
               <a:t>: </a:t>
             </a:r>
             <a:r>
-              <a:rPr lang="en" dirty="0" err="1"/>
+              <a:rPr lang="en" err="1"/>
               <a:t>kagaizacharia@gmail.com</a:t>
             </a:r>
-            <a:endParaRPr dirty="0"/>
+            <a:endParaRPr/>
           </a:p>
           <a:p>
             <a:pPr marL="0" lvl="0" indent="0" algn="l" rtl="0">
@@ -7848,18 +7885,18 @@
               <a:buNone/>
             </a:pPr>
             <a:r>
-              <a:rPr lang="en" b="1" dirty="0" err="1"/>
+              <a:rPr lang="en" b="1" err="1"/>
               <a:t>Github</a:t>
             </a:r>
             <a:r>
-              <a:rPr lang="en" dirty="0"/>
+              <a:rPr lang="en"/>
               <a:t>: </a:t>
             </a:r>
             <a:r>
-              <a:rPr lang="en" dirty="0" err="1"/>
+              <a:rPr lang="en" err="1"/>
               <a:t>ZachariaMwaura</a:t>
             </a:r>
-            <a:endParaRPr dirty="0"/>
+            <a:endParaRPr/>
           </a:p>
           <a:p>
             <a:pPr marL="0" lvl="0" indent="0" algn="l" rtl="0">
@@ -7872,14 +7909,14 @@
               <a:buNone/>
             </a:pPr>
             <a:r>
-              <a:rPr lang="en" b="1" dirty="0"/>
+              <a:rPr lang="en" b="1"/>
               <a:t>LinkedIn</a:t>
             </a:r>
             <a:r>
-              <a:rPr lang="en" dirty="0"/>
+              <a:rPr lang="en"/>
               <a:t>:</a:t>
             </a:r>
-            <a:endParaRPr dirty="0"/>
+            <a:endParaRPr/>
           </a:p>
           <a:p>
             <a:pPr marL="0" lvl="0" indent="0" algn="l" rtl="0">
@@ -7891,7 +7928,7 @@
               </a:spcAft>
               <a:buNone/>
             </a:pPr>
-            <a:endParaRPr dirty="0"/>
+            <a:endParaRPr/>
           </a:p>
           <a:p>
             <a:pPr marL="0" lvl="0" indent="0" algn="l" rtl="0">
@@ -7904,15 +7941,15 @@
               <a:buNone/>
             </a:pPr>
             <a:r>
-              <a:rPr lang="en" b="1" dirty="0"/>
+              <a:rPr lang="en" b="1"/>
               <a:t>Email</a:t>
             </a:r>
             <a:r>
-              <a:rPr lang="en" dirty="0"/>
+              <a:rPr lang="en"/>
               <a:t>: </a:t>
             </a:r>
             <a:r>
-              <a:rPr lang="en" u="sng" dirty="0">
+              <a:rPr lang="en" u="sng">
                 <a:solidFill>
                   <a:schemeClr val="hlink"/>
                 </a:solidFill>
@@ -7920,7 +7957,7 @@
               </a:rPr>
               <a:t>jeffreygoett9@gmail.com</a:t>
             </a:r>
-            <a:endParaRPr dirty="0"/>
+            <a:endParaRPr/>
           </a:p>
           <a:p>
             <a:pPr marL="0" lvl="0" indent="0" algn="l" rtl="0">
@@ -7933,14 +7970,14 @@
               <a:buNone/>
             </a:pPr>
             <a:r>
-              <a:rPr lang="en" b="1" dirty="0" err="1"/>
+              <a:rPr lang="en" b="1" err="1"/>
               <a:t>Github</a:t>
             </a:r>
             <a:r>
-              <a:rPr lang="en" dirty="0"/>
+              <a:rPr lang="en"/>
               <a:t>: @jgoett2</a:t>
             </a:r>
-            <a:endParaRPr dirty="0"/>
+            <a:endParaRPr/>
           </a:p>
           <a:p>
             <a:pPr marL="0" lvl="0" indent="0" algn="l" rtl="0">
@@ -7953,26 +7990,26 @@
               <a:buNone/>
             </a:pPr>
             <a:r>
-              <a:rPr lang="en" b="1" dirty="0"/>
+              <a:rPr lang="en" b="1"/>
               <a:t>LinkedIn</a:t>
             </a:r>
             <a:r>
-              <a:rPr lang="en" dirty="0"/>
+              <a:rPr lang="en"/>
               <a:t>: </a:t>
             </a:r>
             <a:r>
-              <a:rPr lang="en-US" dirty="0"/>
+              <a:rPr lang="en-US"/>
               <a:t>https://</a:t>
             </a:r>
             <a:r>
-              <a:rPr lang="en-US" dirty="0" err="1"/>
+              <a:rPr lang="en-US" err="1"/>
               <a:t>www.linkedin.com</a:t>
             </a:r>
             <a:r>
-              <a:rPr lang="en-US" dirty="0"/>
+              <a:rPr lang="en-US"/>
               <a:t>/in/jeffrey-g-3b3a83a</a:t>
             </a:r>
-            <a:endParaRPr dirty="0"/>
+            <a:endParaRPr/>
           </a:p>
         </p:txBody>
       </p:sp>
@@ -8078,10 +8115,10 @@
               <a:buNone/>
             </a:pPr>
             <a:r>
-              <a:rPr lang="en" dirty="0"/>
+              <a:rPr lang="en"/>
               <a:t>Key findings:</a:t>
             </a:r>
-            <a:endParaRPr dirty="0"/>
+            <a:endParaRPr/>
           </a:p>
           <a:p>
             <a:pPr>
@@ -8090,27 +8127,27 @@
               </a:spcBef>
             </a:pPr>
             <a:r>
-              <a:rPr lang="en" b="1" dirty="0"/>
+              <a:rPr lang="en" b="1"/>
               <a:t>Cessna</a:t>
             </a:r>
             <a:r>
-              <a:rPr lang="en" dirty="0"/>
+              <a:rPr lang="en"/>
               <a:t>, </a:t>
             </a:r>
             <a:r>
-              <a:rPr lang="en" b="1" dirty="0"/>
+              <a:rPr lang="en" b="1"/>
               <a:t>Bell</a:t>
             </a:r>
             <a:r>
-              <a:rPr lang="en" dirty="0"/>
+              <a:rPr lang="en"/>
               <a:t>, and </a:t>
             </a:r>
             <a:r>
-              <a:rPr lang="en" b="1" dirty="0"/>
+              <a:rPr lang="en" b="1"/>
               <a:t>Piper</a:t>
             </a:r>
             <a:r>
-              <a:rPr lang="en" dirty="0"/>
+              <a:rPr lang="en"/>
               <a:t> aircrafts are the safest airplanes.  </a:t>
             </a:r>
           </a:p>
@@ -8122,48 +8159,48 @@
               <a:buSzPts val="1800"/>
             </a:pPr>
             <a:r>
-              <a:rPr lang="en" dirty="0"/>
+              <a:rPr lang="en"/>
               <a:t>Cessna 172, Cessna 158, or Piper PA-28</a:t>
             </a:r>
-            <a:endParaRPr dirty="0"/>
+            <a:endParaRPr/>
           </a:p>
           <a:p>
             <a:r>
-              <a:rPr lang="en" dirty="0"/>
+              <a:rPr lang="en"/>
               <a:t>Most dangerous flight phases: </a:t>
             </a:r>
             <a:r>
-              <a:rPr lang="en" b="1" dirty="0"/>
+              <a:rPr lang="en" b="1"/>
               <a:t>initial climb</a:t>
             </a:r>
             <a:r>
-              <a:rPr lang="en" dirty="0"/>
+              <a:rPr lang="en"/>
               <a:t>, </a:t>
             </a:r>
             <a:r>
-              <a:rPr lang="en" b="1" dirty="0"/>
+              <a:rPr lang="en" b="1"/>
               <a:t>cruise</a:t>
             </a:r>
             <a:r>
-              <a:rPr lang="en" dirty="0"/>
+              <a:rPr lang="en"/>
               <a:t>, and </a:t>
             </a:r>
             <a:r>
-              <a:rPr lang="en" b="1" dirty="0"/>
+              <a:rPr lang="en" b="1"/>
               <a:t>maneuvering</a:t>
             </a:r>
-            <a:endParaRPr b="1" dirty="0"/>
+            <a:endParaRPr b="1"/>
           </a:p>
           <a:p>
             <a:r>
-              <a:rPr lang="en" dirty="0"/>
+              <a:rPr lang="en"/>
               <a:t>Most dangerous time of year to fly: </a:t>
             </a:r>
             <a:r>
-              <a:rPr lang="en" b="1" dirty="0"/>
+              <a:rPr lang="en" b="1"/>
               <a:t>winter</a:t>
             </a:r>
-            <a:endParaRPr b="1" dirty="0"/>
+            <a:endParaRPr b="1"/>
           </a:p>
         </p:txBody>
       </p:sp>
@@ -8575,7 +8612,7 @@
               <a:buChar char="●"/>
             </a:pPr>
             <a:r>
-              <a:rPr lang="en-US" dirty="0"/>
+              <a:rPr lang="en-US"/>
               <a:t>Safety Metric: Protecting passengers during an accident</a:t>
             </a:r>
           </a:p>
@@ -8591,7 +8628,7 @@
               <a:buChar char="○"/>
             </a:pPr>
             <a:r>
-              <a:rPr lang="en-US" dirty="0"/>
+              <a:rPr lang="en-US"/>
               <a:t>Fraction of passengers killed during an accident.</a:t>
             </a:r>
           </a:p>
@@ -8607,7 +8644,7 @@
               <a:buChar char="○"/>
             </a:pPr>
             <a:r>
-              <a:rPr lang="en-US" dirty="0"/>
+              <a:rPr lang="en-US"/>
               <a:t>Fraction of passengers injured during an accident.</a:t>
             </a:r>
           </a:p>
@@ -8617,7 +8654,7 @@
               <a:buChar char="○"/>
             </a:pPr>
             <a:r>
-              <a:rPr lang="en-US" dirty="0"/>
+              <a:rPr lang="en-US"/>
               <a:t>Focused on smaller aircraft</a:t>
             </a:r>
           </a:p>
@@ -8632,7 +8669,7 @@
               <a:buSzPts val="1400"/>
               <a:buChar char="○"/>
             </a:pPr>
-            <a:endParaRPr lang="en" dirty="0"/>
+            <a:endParaRPr lang="en"/>
           </a:p>
         </p:txBody>
       </p:sp>
@@ -8861,7 +8898,7 @@
         </p:spPr>
         <p:txBody>
           <a:bodyPr spcFirstLastPara="1" wrap="square" lIns="91425" tIns="91425" rIns="91425" bIns="91425" anchor="t" anchorCtr="0">
-            <a:normAutofit/>
+            <a:normAutofit fontScale="62500" lnSpcReduction="20000"/>
           </a:bodyPr>
           <a:lstStyle/>
           <a:p>
@@ -8998,7 +9035,7 @@
         </p:spPr>
         <p:txBody>
           <a:bodyPr spcFirstLastPara="1" wrap="square" lIns="91425" tIns="91425" rIns="91425" bIns="91425" anchor="t" anchorCtr="0">
-            <a:normAutofit/>
+            <a:normAutofit fontScale="92500" lnSpcReduction="20000"/>
           </a:bodyPr>
           <a:lstStyle/>
           <a:p>
@@ -9012,39 +9049,40 @@
               <a:buNone/>
             </a:pPr>
             <a:r>
-              <a:rPr lang="en"/>
+              <a:rPr lang="en" dirty="0"/>
               <a:t>The initial climb, maneuvering, and cruise phases are the most dangerous.</a:t>
             </a:r>
-            <a:endParaRPr/>
+            <a:endParaRPr dirty="0"/>
           </a:p>
         </p:txBody>
       </p:sp>
       <p:pic>
         <p:nvPicPr>
-          <p:cNvPr id="112" name="Google Shape;112;p20"/>
-          <p:cNvPicPr preferRelativeResize="0"/>
+          <p:cNvPr id="7" name="Picture 6" descr="A graph with different colored bars&#10;&#10;Description automatically generated">
+            <a:extLst>
+              <a:ext uri="{FF2B5EF4-FFF2-40B4-BE49-F238E27FC236}">
+                <a16:creationId xmlns:a16="http://schemas.microsoft.com/office/drawing/2014/main" id="{93C8911A-CECC-19E3-2CA7-E17E981AB770}"/>
+              </a:ext>
+            </a:extLst>
+          </p:cNvPr>
+          <p:cNvPicPr>
+            <a:picLocks noChangeAspect="1"/>
+          </p:cNvPicPr>
           <p:nvPr/>
         </p:nvPicPr>
         <p:blipFill>
-          <a:blip r:embed="rId3">
-            <a:alphaModFix/>
-          </a:blip>
-          <a:stretch>
-            <a:fillRect/>
-          </a:stretch>
+          <a:blip r:embed="rId3"/>
+          <a:srcRect t="10291"/>
+          <a:stretch/>
         </p:blipFill>
         <p:spPr>
           <a:xfrm>
-            <a:off x="1491175" y="1635875"/>
-            <a:ext cx="6161649" cy="3080824"/>
+            <a:off x="685800" y="1552353"/>
+            <a:ext cx="7772400" cy="3486272"/>
           </a:xfrm>
           <a:prstGeom prst="rect">
             <a:avLst/>
           </a:prstGeom>
-          <a:noFill/>
-          <a:ln>
-            <a:noFill/>
-          </a:ln>
         </p:spPr>
       </p:pic>
     </p:spTree>
@@ -9135,7 +9173,7 @@
         </p:spPr>
         <p:txBody>
           <a:bodyPr spcFirstLastPara="1" wrap="square" lIns="91425" tIns="91425" rIns="91425" bIns="91425" anchor="t" anchorCtr="0">
-            <a:normAutofit/>
+            <a:normAutofit fontScale="62500" lnSpcReduction="20000"/>
           </a:bodyPr>
           <a:lstStyle/>
           <a:p>
@@ -9158,30 +9196,32 @@
       </p:sp>
       <p:pic>
         <p:nvPicPr>
-          <p:cNvPr id="119" name="Google Shape;119;p21"/>
-          <p:cNvPicPr preferRelativeResize="0"/>
+          <p:cNvPr id="3" name="Picture 2" descr="A graph showing different colored bars&#10;&#10;Description automatically generated">
+            <a:extLst>
+              <a:ext uri="{FF2B5EF4-FFF2-40B4-BE49-F238E27FC236}">
+                <a16:creationId xmlns:a16="http://schemas.microsoft.com/office/drawing/2014/main" id="{C13D296C-57CC-C1AA-5DA5-6BD7FE02EB5B}"/>
+              </a:ext>
+            </a:extLst>
+          </p:cNvPr>
+          <p:cNvPicPr>
+            <a:picLocks noChangeAspect="1"/>
+          </p:cNvPicPr>
           <p:nvPr/>
         </p:nvPicPr>
         <p:blipFill>
-          <a:blip r:embed="rId3">
-            <a:alphaModFix/>
-          </a:blip>
+          <a:blip r:embed="rId3"/>
           <a:stretch>
             <a:fillRect/>
           </a:stretch>
         </p:blipFill>
         <p:spPr>
           <a:xfrm>
-            <a:off x="2330825" y="1750075"/>
-            <a:ext cx="4482350" cy="3137650"/>
+            <a:off x="2062110" y="1392100"/>
+            <a:ext cx="5019780" cy="3513845"/>
           </a:xfrm>
           <a:prstGeom prst="rect">
             <a:avLst/>
           </a:prstGeom>
-          <a:noFill/>
-          <a:ln>
-            <a:noFill/>
-          </a:ln>
         </p:spPr>
       </p:pic>
     </p:spTree>

</xml_diff>